<commit_message>
minor updates to lectures
</commit_message>
<xml_diff>
--- a/assets/lectures/cshl/2025/full/RNASeq_Module3_AbundanceEstimation_DifferentialExpression.pptx
+++ b/assets/lectures/cshl/2025/full/RNASeq_Module3_AbundanceEstimation_DifferentialExpression.pptx
@@ -221,7 +221,7 @@
           <a:p>
             <a:fld id="{827BD9F9-8452-A342-BB1B-28ECF19E2CC5}" type="datetimeFigureOut">
               <a:rPr lang="en-US" smtClean="0"/>
-              <a:t>11/14/25</a:t>
+              <a:t>11/16/25</a:t>
             </a:fld>
             <a:endParaRPr lang="en-US"/>
           </a:p>
@@ -3051,14 +3051,14 @@
           </a:ln>
           <a:extLst>
             <a:ext uri="{909E8E84-426E-40dd-AFC4-6F175D3DCCD1}">
-              <a14:hiddenFill xmlns:a14="http://schemas.microsoft.com/office/drawing/2010/main" xmlns="">
+              <a14:hiddenFill xmlns="" xmlns:a14="http://schemas.microsoft.com/office/drawing/2010/main">
                 <a:solidFill>
                   <a:srgbClr val="FFFFFF"/>
                 </a:solidFill>
               </a14:hiddenFill>
             </a:ext>
             <a:ext uri="{91240B29-F687-4f45-9708-019B960494DF}">
-              <a14:hiddenLine xmlns:a14="http://schemas.microsoft.com/office/drawing/2010/main" xmlns="" w="9525">
+              <a14:hiddenLine xmlns="" xmlns:a14="http://schemas.microsoft.com/office/drawing/2010/main" w="9525">
                 <a:solidFill>
                   <a:srgbClr val="000000"/>
                 </a:solidFill>
@@ -3298,14 +3298,14 @@
           </a:ln>
           <a:extLst>
             <a:ext uri="{909E8E84-426E-40dd-AFC4-6F175D3DCCD1}">
-              <a14:hiddenFill xmlns="" xmlns:a14="http://schemas.microsoft.com/office/drawing/2010/main">
+              <a14:hiddenFill xmlns:a14="http://schemas.microsoft.com/office/drawing/2010/main" xmlns="">
                 <a:solidFill>
                   <a:srgbClr val="FFFFFF"/>
                 </a:solidFill>
               </a14:hiddenFill>
             </a:ext>
             <a:ext uri="{91240B29-F687-4f45-9708-019B960494DF}">
-              <a14:hiddenLine xmlns="" xmlns:a14="http://schemas.microsoft.com/office/drawing/2010/main" w="9525">
+              <a14:hiddenLine xmlns:a14="http://schemas.microsoft.com/office/drawing/2010/main" xmlns="" w="9525">
                 <a:solidFill>
                   <a:srgbClr val="000000"/>
                 </a:solidFill>
@@ -4363,14 +4363,14 @@
           </a:ln>
           <a:extLst>
             <a:ext uri="{909E8E84-426E-40dd-AFC4-6F175D3DCCD1}">
-              <a14:hiddenFill xmlns:a14="http://schemas.microsoft.com/office/drawing/2010/main" xmlns="">
+              <a14:hiddenFill xmlns="" xmlns:a14="http://schemas.microsoft.com/office/drawing/2010/main">
                 <a:solidFill>
                   <a:srgbClr val="FFFFFF"/>
                 </a:solidFill>
               </a14:hiddenFill>
             </a:ext>
             <a:ext uri="{91240B29-F687-4f45-9708-019B960494DF}">
-              <a14:hiddenLine xmlns:a14="http://schemas.microsoft.com/office/drawing/2010/main" xmlns="" w="9525">
+              <a14:hiddenLine xmlns="" xmlns:a14="http://schemas.microsoft.com/office/drawing/2010/main" w="9525">
                 <a:solidFill>
                   <a:srgbClr val="000000"/>
                 </a:solidFill>
@@ -4942,14 +4942,14 @@
           </a:ln>
           <a:extLst>
             <a:ext uri="{909E8E84-426E-40dd-AFC4-6F175D3DCCD1}">
-              <a14:hiddenFill xmlns="" xmlns:a14="http://schemas.microsoft.com/office/drawing/2010/main">
+              <a14:hiddenFill xmlns:a14="http://schemas.microsoft.com/office/drawing/2010/main" xmlns="">
                 <a:solidFill>
                   <a:srgbClr val="FFFFFF"/>
                 </a:solidFill>
               </a14:hiddenFill>
             </a:ext>
             <a:ext uri="{91240B29-F687-4f45-9708-019B960494DF}">
-              <a14:hiddenLine xmlns="" xmlns:a14="http://schemas.microsoft.com/office/drawing/2010/main" w="9525">
+              <a14:hiddenLine xmlns:a14="http://schemas.microsoft.com/office/drawing/2010/main" xmlns="" w="9525">
                 <a:solidFill>
                   <a:srgbClr val="000000"/>
                 </a:solidFill>
@@ -6462,14 +6462,14 @@
           </a:ln>
           <a:extLst>
             <a:ext uri="{909E8E84-426E-40dd-AFC4-6F175D3DCCD1}">
-              <a14:hiddenFill xmlns:a14="http://schemas.microsoft.com/office/drawing/2010/main" xmlns="">
+              <a14:hiddenFill xmlns="" xmlns:a14="http://schemas.microsoft.com/office/drawing/2010/main">
                 <a:solidFill>
                   <a:srgbClr val="FFFFFF"/>
                 </a:solidFill>
               </a14:hiddenFill>
             </a:ext>
             <a:ext uri="{91240B29-F687-4f45-9708-019B960494DF}">
-              <a14:hiddenLine xmlns:a14="http://schemas.microsoft.com/office/drawing/2010/main" xmlns="" w="9525">
+              <a14:hiddenLine xmlns="" xmlns:a14="http://schemas.microsoft.com/office/drawing/2010/main" w="9525">
                 <a:solidFill>
                   <a:srgbClr val="000000"/>
                 </a:solidFill>
@@ -8107,14 +8107,14 @@
           </a:ln>
           <a:extLst>
             <a:ext uri="{909E8E84-426E-40dd-AFC4-6F175D3DCCD1}">
-              <a14:hiddenFill xmlns="" xmlns:a14="http://schemas.microsoft.com/office/drawing/2010/main">
+              <a14:hiddenFill xmlns:a14="http://schemas.microsoft.com/office/drawing/2010/main" xmlns="">
                 <a:solidFill>
                   <a:srgbClr val="FFFFFF"/>
                 </a:solidFill>
               </a14:hiddenFill>
             </a:ext>
             <a:ext uri="{91240B29-F687-4f45-9708-019B960494DF}">
-              <a14:hiddenLine xmlns="" xmlns:a14="http://schemas.microsoft.com/office/drawing/2010/main" w="9525">
+              <a14:hiddenLine xmlns:a14="http://schemas.microsoft.com/office/drawing/2010/main" xmlns="" w="9525">
                 <a:solidFill>
                   <a:srgbClr val="000000"/>
                 </a:solidFill>
@@ -10362,9 +10362,15 @@
       </p:sp>
       <p:pic>
         <p:nvPicPr>
-          <p:cNvPr id="3" name="Picture 2" descr="Screen Shot 2013-06-01 at 10.13.40 PM.png"/>
+          <p:cNvPr id="1028" name="Picture 4" descr="DE-method-comparison">
+            <a:extLst>
+              <a:ext uri="{FF2B5EF4-FFF2-40B4-BE49-F238E27FC236}">
+                <a16:creationId xmlns:a16="http://schemas.microsoft.com/office/drawing/2014/main" id="{13037EF4-2FD0-9425-FE70-F860402641C2}"/>
+              </a:ext>
+            </a:extLst>
+          </p:cNvPr>
           <p:cNvPicPr>
-            <a:picLocks noChangeAspect="1"/>
+            <a:picLocks noChangeAspect="1" noChangeArrowheads="1"/>
           </p:cNvPicPr>
           <p:nvPr/>
         </p:nvPicPr>
@@ -10376,18 +10382,29 @@
               </a:ext>
             </a:extLst>
           </a:blip>
+          <a:srcRect/>
           <a:stretch>
             <a:fillRect/>
           </a:stretch>
         </p:blipFill>
-        <p:spPr>
+        <p:spPr bwMode="auto">
           <a:xfrm>
-            <a:off x="3071664" y="1440160"/>
-            <a:ext cx="6078124" cy="4653136"/>
+            <a:off x="3542000" y="1097280"/>
+            <a:ext cx="5107999" cy="5138928"/>
           </a:xfrm>
           <a:prstGeom prst="rect">
             <a:avLst/>
           </a:prstGeom>
+          <a:noFill/>
+          <a:extLst>
+            <a:ext uri="{909E8E84-426E-40DD-AFC4-6F175D3DCCD1}">
+              <a14:hiddenFill xmlns:a14="http://schemas.microsoft.com/office/drawing/2010/main">
+                <a:solidFill>
+                  <a:srgbClr val="FFFFFF"/>
+                </a:solidFill>
+              </a14:hiddenFill>
+            </a:ext>
+          </a:extLst>
         </p:spPr>
       </p:pic>
     </p:spTree>
@@ -10469,7 +10486,7 @@
         </p:spPr>
         <p:txBody>
           <a:bodyPr>
-            <a:normAutofit lnSpcReduction="10000"/>
+            <a:normAutofit/>
           </a:bodyPr>
           <a:lstStyle/>
           <a:p>
@@ -10508,19 +10525,15 @@
                 <a:ea typeface="ＭＳ Ｐゴシック" charset="0"/>
                 <a:hlinkClick r:id="rId2"/>
               </a:rPr>
-              <a:t>http://scotty.genetics.utah.edu/</a:t>
-            </a:r>
-            <a:endParaRPr lang="en-US" dirty="0">
-              <a:latin typeface="Calibri" charset="0"/>
-              <a:ea typeface="ＭＳ Ｐゴシック" charset="0"/>
-            </a:endParaRPr>
-          </a:p>
-          <a:p>
-            <a:pPr lvl="1"/>
-            <a:endParaRPr lang="en-US" dirty="0">
-              <a:latin typeface="Calibri" charset="0"/>
-              <a:ea typeface="ＭＳ Ｐゴシック" charset="0"/>
-            </a:endParaRPr>
+              <a:t>https://www.biostars.org/p/455764/</a:t>
+            </a:r>
+            <a:r>
+              <a:rPr lang="en-US" dirty="0">
+                <a:latin typeface="Calibri" charset="0"/>
+                <a:ea typeface="ＭＳ Ｐゴシック" charset="0"/>
+              </a:rPr>
+              <a:t> </a:t>
+            </a:r>
           </a:p>
           <a:p>
             <a:r>
@@ -10705,14 +10718,14 @@
           </a:ln>
           <a:extLst>
             <a:ext uri="{909E8E84-426E-40dd-AFC4-6F175D3DCCD1}">
-              <a14:hiddenFill xmlns="" xmlns:a14="http://schemas.microsoft.com/office/drawing/2010/main">
+              <a14:hiddenFill xmlns:a14="http://schemas.microsoft.com/office/drawing/2010/main" xmlns="">
                 <a:solidFill>
                   <a:srgbClr val="FFFFFF"/>
                 </a:solidFill>
               </a14:hiddenFill>
             </a:ext>
             <a:ext uri="{91240B29-F687-4f45-9708-019B960494DF}">
-              <a14:hiddenLine xmlns="" xmlns:a14="http://schemas.microsoft.com/office/drawing/2010/main" w="9525">
+              <a14:hiddenLine xmlns:a14="http://schemas.microsoft.com/office/drawing/2010/main" xmlns="" w="9525">
                 <a:solidFill>
                   <a:srgbClr val="000000"/>
                 </a:solidFill>
@@ -10902,14 +10915,14 @@
           </a:ln>
           <a:extLst>
             <a:ext uri="{909E8E84-426E-40dd-AFC4-6F175D3DCCD1}">
-              <a14:hiddenFill xmlns="" xmlns:a14="http://schemas.microsoft.com/office/drawing/2010/main">
+              <a14:hiddenFill xmlns:a14="http://schemas.microsoft.com/office/drawing/2010/main" xmlns="">
                 <a:solidFill>
                   <a:srgbClr val="FFFFFF"/>
                 </a:solidFill>
               </a14:hiddenFill>
             </a:ext>
             <a:ext uri="{91240B29-F687-4f45-9708-019B960494DF}">
-              <a14:hiddenLine xmlns="" xmlns:a14="http://schemas.microsoft.com/office/drawing/2010/main" w="9525">
+              <a14:hiddenLine xmlns:a14="http://schemas.microsoft.com/office/drawing/2010/main" xmlns="" w="9525">
                 <a:solidFill>
                   <a:srgbClr val="000000"/>
                 </a:solidFill>
@@ -12238,14 +12251,14 @@
           </a:ln>
           <a:extLst>
             <a:ext uri="{909E8E84-426E-40dd-AFC4-6F175D3DCCD1}">
-              <a14:hiddenFill xmlns="" xmlns:a14="http://schemas.microsoft.com/office/drawing/2010/main">
+              <a14:hiddenFill xmlns:a14="http://schemas.microsoft.com/office/drawing/2010/main" xmlns="">
                 <a:solidFill>
                   <a:srgbClr val="FFFFFF"/>
                 </a:solidFill>
               </a14:hiddenFill>
             </a:ext>
             <a:ext uri="{91240B29-F687-4f45-9708-019B960494DF}">
-              <a14:hiddenLine xmlns="" xmlns:a14="http://schemas.microsoft.com/office/drawing/2010/main" w="9525">
+              <a14:hiddenLine xmlns:a14="http://schemas.microsoft.com/office/drawing/2010/main" xmlns="" w="9525">
                 <a:solidFill>
                   <a:srgbClr val="000000"/>
                 </a:solidFill>
@@ -12726,14 +12739,14 @@
             </a:ln>
             <a:extLst>
               <a:ext uri="{909E8E84-426E-40dd-AFC4-6F175D3DCCD1}">
-                <a14:hiddenFill xmlns="" xmlns:a14="http://schemas.microsoft.com/office/drawing/2010/main">
+                <a14:hiddenFill xmlns:a14="http://schemas.microsoft.com/office/drawing/2010/main" xmlns="">
                   <a:solidFill>
                     <a:srgbClr val="FFFFFF"/>
                   </a:solidFill>
                 </a14:hiddenFill>
               </a:ext>
               <a:ext uri="{91240B29-F687-4f45-9708-019B960494DF}">
-                <a14:hiddenLine xmlns="" xmlns:a14="http://schemas.microsoft.com/office/drawing/2010/main" w="9525">
+                <a14:hiddenLine xmlns:a14="http://schemas.microsoft.com/office/drawing/2010/main" xmlns="" w="9525">
                   <a:solidFill>
                     <a:srgbClr val="000000"/>
                   </a:solidFill>
@@ -13045,14 +13058,14 @@
             </a:ln>
             <a:extLst>
               <a:ext uri="{909E8E84-426E-40dd-AFC4-6F175D3DCCD1}">
-                <a14:hiddenFill xmlns="" xmlns:a14="http://schemas.microsoft.com/office/drawing/2010/main">
+                <a14:hiddenFill xmlns:a14="http://schemas.microsoft.com/office/drawing/2010/main" xmlns="">
                   <a:solidFill>
                     <a:srgbClr val="FFFFFF"/>
                   </a:solidFill>
                 </a14:hiddenFill>
               </a:ext>
               <a:ext uri="{91240B29-F687-4f45-9708-019B960494DF}">
-                <a14:hiddenLine xmlns="" xmlns:a14="http://schemas.microsoft.com/office/drawing/2010/main" w="9525">
+                <a14:hiddenLine xmlns:a14="http://schemas.microsoft.com/office/drawing/2010/main" xmlns="" w="9525">
                   <a:solidFill>
                     <a:srgbClr val="000000"/>
                   </a:solidFill>
@@ -13378,14 +13391,14 @@
             </a:ln>
             <a:extLst>
               <a:ext uri="{909E8E84-426E-40dd-AFC4-6F175D3DCCD1}">
-                <a14:hiddenFill xmlns="" xmlns:a14="http://schemas.microsoft.com/office/drawing/2010/main">
+                <a14:hiddenFill xmlns:a14="http://schemas.microsoft.com/office/drawing/2010/main" xmlns="">
                   <a:solidFill>
                     <a:srgbClr val="FFFFFF"/>
                   </a:solidFill>
                 </a14:hiddenFill>
               </a:ext>
               <a:ext uri="{91240B29-F687-4f45-9708-019B960494DF}">
-                <a14:hiddenLine xmlns="" xmlns:a14="http://schemas.microsoft.com/office/drawing/2010/main" w="9525">
+                <a14:hiddenLine xmlns:a14="http://schemas.microsoft.com/office/drawing/2010/main" xmlns="" w="9525">
                   <a:solidFill>
                     <a:srgbClr val="000000"/>
                   </a:solidFill>
@@ -13711,14 +13724,14 @@
             </a:ln>
             <a:extLst>
               <a:ext uri="{909E8E84-426E-40dd-AFC4-6F175D3DCCD1}">
-                <a14:hiddenFill xmlns="" xmlns:a14="http://schemas.microsoft.com/office/drawing/2010/main">
+                <a14:hiddenFill xmlns:a14="http://schemas.microsoft.com/office/drawing/2010/main" xmlns="">
                   <a:solidFill>
                     <a:srgbClr val="FFFFFF"/>
                   </a:solidFill>
                 </a14:hiddenFill>
               </a:ext>
               <a:ext uri="{91240B29-F687-4f45-9708-019B960494DF}">
-                <a14:hiddenLine xmlns="" xmlns:a14="http://schemas.microsoft.com/office/drawing/2010/main" w="9525">
+                <a14:hiddenLine xmlns:a14="http://schemas.microsoft.com/office/drawing/2010/main" xmlns="" w="9525">
                   <a:solidFill>
                     <a:srgbClr val="000000"/>
                   </a:solidFill>
@@ -14044,14 +14057,14 @@
             </a:ln>
             <a:extLst>
               <a:ext uri="{909E8E84-426E-40dd-AFC4-6F175D3DCCD1}">
-                <a14:hiddenFill xmlns="" xmlns:a14="http://schemas.microsoft.com/office/drawing/2010/main">
+                <a14:hiddenFill xmlns:a14="http://schemas.microsoft.com/office/drawing/2010/main" xmlns="">
                   <a:solidFill>
                     <a:srgbClr val="FFFFFF"/>
                   </a:solidFill>
                 </a14:hiddenFill>
               </a:ext>
               <a:ext uri="{91240B29-F687-4f45-9708-019B960494DF}">
-                <a14:hiddenLine xmlns="" xmlns:a14="http://schemas.microsoft.com/office/drawing/2010/main" w="9525">
+                <a14:hiddenLine xmlns:a14="http://schemas.microsoft.com/office/drawing/2010/main" xmlns="" w="9525">
                   <a:solidFill>
                     <a:srgbClr val="000000"/>
                   </a:solidFill>
@@ -14380,14 +14393,14 @@
             </a:ln>
             <a:extLst>
               <a:ext uri="{909E8E84-426E-40dd-AFC4-6F175D3DCCD1}">
-                <a14:hiddenFill xmlns="" xmlns:a14="http://schemas.microsoft.com/office/drawing/2010/main">
+                <a14:hiddenFill xmlns:a14="http://schemas.microsoft.com/office/drawing/2010/main" xmlns="">
                   <a:solidFill>
                     <a:srgbClr val="FFFFFF"/>
                   </a:solidFill>
                 </a14:hiddenFill>
               </a:ext>
               <a:ext uri="{91240B29-F687-4f45-9708-019B960494DF}">
-                <a14:hiddenLine xmlns="" xmlns:a14="http://schemas.microsoft.com/office/drawing/2010/main" w="9525">
+                <a14:hiddenLine xmlns:a14="http://schemas.microsoft.com/office/drawing/2010/main" xmlns="" w="9525">
                   <a:solidFill>
                     <a:srgbClr val="000000"/>
                   </a:solidFill>
@@ -15409,14 +15422,14 @@
           </a:ln>
           <a:extLst>
             <a:ext uri="{909E8E84-426E-40dd-AFC4-6F175D3DCCD1}">
-              <a14:hiddenFill xmlns="" xmlns:a14="http://schemas.microsoft.com/office/drawing/2010/main">
+              <a14:hiddenFill xmlns:a14="http://schemas.microsoft.com/office/drawing/2010/main" xmlns="">
                 <a:solidFill>
                   <a:srgbClr val="FFFFFF"/>
                 </a:solidFill>
               </a14:hiddenFill>
             </a:ext>
             <a:ext uri="{91240B29-F687-4f45-9708-019B960494DF}">
-              <a14:hiddenLine xmlns="" xmlns:a14="http://schemas.microsoft.com/office/drawing/2010/main" w="9525">
+              <a14:hiddenLine xmlns:a14="http://schemas.microsoft.com/office/drawing/2010/main" xmlns="" w="9525">
                 <a:solidFill>
                   <a:srgbClr val="000000"/>
                 </a:solidFill>
@@ -15637,7 +15650,7 @@
         </p:blipFill>
         <p:spPr bwMode="auto">
           <a:xfrm>
-            <a:off x="1531920" y="1742736"/>
+            <a:off x="1662545" y="1742736"/>
             <a:ext cx="8625333" cy="4104826"/>
           </a:xfrm>
           <a:prstGeom prst="rect">

</xml_diff>